<commit_message>
Lição de casa 1
adicionada a lição de casa 1
</commit_message>
<xml_diff>
--- a/Curso_Python.pptx
+++ b/Curso_Python.pptx
@@ -17910,9 +17910,9 @@
     <a:overrideClrMapping bg1="dk1" tx1="lt1" bg2="dk2" tx2="lt2" accent1="accent1" accent2="accent2" accent3="accent3" accent4="accent4" accent5="accent5" accent6="accent6" hlink="hlink" folHlink="folHlink"/>
   </p:clrMapOvr>
   <mc:AlternateContent xmlns:mc="http://schemas.openxmlformats.org/markup-compatibility/2006">
-    <mc:Choice xmlns:p14="http://schemas.microsoft.com/office/powerpoint/2010/main" Requires="p14">
-      <p:transition spd="slow" p14:dur="2000">
-        <p14:reveal/>
+    <mc:Choice xmlns:p159="http://schemas.microsoft.com/office/powerpoint/2015/09/main" Requires="p159">
+      <p:transition xmlns:p14="http://schemas.microsoft.com/office/powerpoint/2010/main" spd="slow" p14:dur="2000">
+        <p159:morph option="byObject"/>
       </p:transition>
     </mc:Choice>
     <mc:Fallback>

</xml_diff>